<commit_message>
Slight update to presentation
</commit_message>
<xml_diff>
--- a/WeeklyPresentations/update4_03_26.pptx
+++ b/WeeklyPresentations/update4_03_26.pptx
@@ -3685,6 +3685,76 @@
           </a:p>
         </p:txBody>
       </p:sp>
+      <p:pic>
+        <p:nvPicPr>
+          <p:cNvPr id="4" name="Picture 3">
+            <a:extLst>
+              <a:ext uri="{FF2B5EF4-FFF2-40B4-BE49-F238E27FC236}">
+                <a16:creationId xmlns:a16="http://schemas.microsoft.com/office/drawing/2014/main" id="{248EAEF1-1936-48FF-BB10-0CCF7A0ADB70}"/>
+              </a:ext>
+            </a:extLst>
+          </p:cNvPr>
+          <p:cNvPicPr>
+            <a:picLocks noChangeAspect="1"/>
+          </p:cNvPicPr>
+          <p:nvPr/>
+        </p:nvPicPr>
+        <p:blipFill>
+          <a:blip r:embed="rId2"/>
+          <a:stretch>
+            <a:fillRect/>
+          </a:stretch>
+        </p:blipFill>
+        <p:spPr>
+          <a:xfrm>
+            <a:off x="7026863" y="3784146"/>
+            <a:ext cx="5000625" cy="857250"/>
+          </a:xfrm>
+          <a:prstGeom prst="rect">
+            <a:avLst/>
+          </a:prstGeom>
+          <a:ln>
+            <a:solidFill>
+              <a:schemeClr val="tx1"/>
+            </a:solidFill>
+          </a:ln>
+        </p:spPr>
+      </p:pic>
+      <p:pic>
+        <p:nvPicPr>
+          <p:cNvPr id="5" name="Picture 4">
+            <a:extLst>
+              <a:ext uri="{FF2B5EF4-FFF2-40B4-BE49-F238E27FC236}">
+                <a16:creationId xmlns:a16="http://schemas.microsoft.com/office/drawing/2014/main" id="{46C72665-6BF6-4791-8F2B-74F90D548250}"/>
+              </a:ext>
+            </a:extLst>
+          </p:cNvPr>
+          <p:cNvPicPr>
+            <a:picLocks noChangeAspect="1"/>
+          </p:cNvPicPr>
+          <p:nvPr/>
+        </p:nvPicPr>
+        <p:blipFill>
+          <a:blip r:embed="rId3"/>
+          <a:stretch>
+            <a:fillRect/>
+          </a:stretch>
+        </p:blipFill>
+        <p:spPr>
+          <a:xfrm>
+            <a:off x="7175500" y="2587965"/>
+            <a:ext cx="5016500" cy="752475"/>
+          </a:xfrm>
+          <a:prstGeom prst="rect">
+            <a:avLst/>
+          </a:prstGeom>
+          <a:ln>
+            <a:solidFill>
+              <a:schemeClr val="tx1"/>
+            </a:solidFill>
+          </a:ln>
+        </p:spPr>
+      </p:pic>
     </p:spTree>
     <p:extLst>
       <p:ext uri="{BB962C8B-B14F-4D97-AF65-F5344CB8AC3E}">
@@ -3760,7 +3830,12 @@
             <p:ph idx="1"/>
           </p:nvPr>
         </p:nvSpPr>
-        <p:spPr/>
+        <p:spPr>
+          <a:xfrm>
+            <a:off x="397392" y="1825626"/>
+            <a:ext cx="3977640" cy="4351338"/>
+          </a:xfrm>
+        </p:spPr>
         <p:txBody>
           <a:bodyPr/>
           <a:lstStyle/>
@@ -3801,8 +3876,8 @@
         </p:blipFill>
         <p:spPr>
           <a:xfrm>
-            <a:off x="2478739" y="3273425"/>
-            <a:ext cx="7234522" cy="3584575"/>
+            <a:off x="4659166" y="1947545"/>
+            <a:ext cx="7353158" cy="3643357"/>
           </a:xfrm>
           <a:prstGeom prst="rect">
             <a:avLst/>

</xml_diff>